<commit_message>
Actualización de archivos y mejoras
</commit_message>
<xml_diff>
--- a/docs/CV.pptx
+++ b/docs/CV.pptx
@@ -107,6 +107,14 @@
       </a:defRPr>
     </a:lvl9pPr>
   </p:defaultTextStyle>
+  <p:extLst>
+    <p:ext uri="{EFAFB233-063F-42B5-8137-9DF3F51BA10A}">
+      <p15:sldGuideLst xmlns:p15="http://schemas.microsoft.com/office/powerpoint/2012/main"/>
+    </p:ext>
+    <p:ext uri="{2D200454-40CA-4A62-9FC3-DE9A4176ACB9}">
+      <p15:notesGuideLst xmlns:p15="http://schemas.microsoft.com/office/powerpoint/2012/main"/>
+    </p:ext>
+  </p:extLst>
 </p:presentation>
 </file>
 
@@ -192,7 +200,7 @@
           <a:p>
             <a:fld id="{45240B0F-28DB-4AD9-98DE-8C86967A83D3}" type="datetimeFigureOut">
               <a:rPr lang="es-PE" smtClean="0"/>
-              <a:t>27/10/2024</a:t>
+              <a:t>10/12/2024</a:t>
             </a:fld>
             <a:endParaRPr lang="es-PE"/>
           </a:p>
@@ -680,7 +688,7 @@
           <a:p>
             <a:fld id="{5278D71A-5AE1-4FDD-A707-1E782C596AE6}" type="datetimeFigureOut">
               <a:rPr lang="es-PE" smtClean="0"/>
-              <a:t>27/10/2024</a:t>
+              <a:t>10/12/2024</a:t>
             </a:fld>
             <a:endParaRPr lang="es-PE"/>
           </a:p>
@@ -850,7 +858,7 @@
           <a:p>
             <a:fld id="{5278D71A-5AE1-4FDD-A707-1E782C596AE6}" type="datetimeFigureOut">
               <a:rPr lang="es-PE" smtClean="0"/>
-              <a:t>27/10/2024</a:t>
+              <a:t>10/12/2024</a:t>
             </a:fld>
             <a:endParaRPr lang="es-PE"/>
           </a:p>
@@ -1030,7 +1038,7 @@
           <a:p>
             <a:fld id="{5278D71A-5AE1-4FDD-A707-1E782C596AE6}" type="datetimeFigureOut">
               <a:rPr lang="es-PE" smtClean="0"/>
-              <a:t>27/10/2024</a:t>
+              <a:t>10/12/2024</a:t>
             </a:fld>
             <a:endParaRPr lang="es-PE"/>
           </a:p>
@@ -1200,7 +1208,7 @@
           <a:p>
             <a:fld id="{5278D71A-5AE1-4FDD-A707-1E782C596AE6}" type="datetimeFigureOut">
               <a:rPr lang="es-PE" smtClean="0"/>
-              <a:t>27/10/2024</a:t>
+              <a:t>10/12/2024</a:t>
             </a:fld>
             <a:endParaRPr lang="es-PE"/>
           </a:p>
@@ -1444,7 +1452,7 @@
           <a:p>
             <a:fld id="{5278D71A-5AE1-4FDD-A707-1E782C596AE6}" type="datetimeFigureOut">
               <a:rPr lang="es-PE" smtClean="0"/>
-              <a:t>27/10/2024</a:t>
+              <a:t>10/12/2024</a:t>
             </a:fld>
             <a:endParaRPr lang="es-PE"/>
           </a:p>
@@ -1676,7 +1684,7 @@
           <a:p>
             <a:fld id="{5278D71A-5AE1-4FDD-A707-1E782C596AE6}" type="datetimeFigureOut">
               <a:rPr lang="es-PE" smtClean="0"/>
-              <a:t>27/10/2024</a:t>
+              <a:t>10/12/2024</a:t>
             </a:fld>
             <a:endParaRPr lang="es-PE"/>
           </a:p>
@@ -2043,7 +2051,7 @@
           <a:p>
             <a:fld id="{5278D71A-5AE1-4FDD-A707-1E782C596AE6}" type="datetimeFigureOut">
               <a:rPr lang="es-PE" smtClean="0"/>
-              <a:t>27/10/2024</a:t>
+              <a:t>10/12/2024</a:t>
             </a:fld>
             <a:endParaRPr lang="es-PE"/>
           </a:p>
@@ -2161,7 +2169,7 @@
           <a:p>
             <a:fld id="{5278D71A-5AE1-4FDD-A707-1E782C596AE6}" type="datetimeFigureOut">
               <a:rPr lang="es-PE" smtClean="0"/>
-              <a:t>27/10/2024</a:t>
+              <a:t>10/12/2024</a:t>
             </a:fld>
             <a:endParaRPr lang="es-PE"/>
           </a:p>
@@ -2256,7 +2264,7 @@
           <a:p>
             <a:fld id="{5278D71A-5AE1-4FDD-A707-1E782C596AE6}" type="datetimeFigureOut">
               <a:rPr lang="es-PE" smtClean="0"/>
-              <a:t>27/10/2024</a:t>
+              <a:t>10/12/2024</a:t>
             </a:fld>
             <a:endParaRPr lang="es-PE"/>
           </a:p>
@@ -2533,7 +2541,7 @@
           <a:p>
             <a:fld id="{5278D71A-5AE1-4FDD-A707-1E782C596AE6}" type="datetimeFigureOut">
               <a:rPr lang="es-PE" smtClean="0"/>
-              <a:t>27/10/2024</a:t>
+              <a:t>10/12/2024</a:t>
             </a:fld>
             <a:endParaRPr lang="es-PE"/>
           </a:p>
@@ -2790,7 +2798,7 @@
           <a:p>
             <a:fld id="{5278D71A-5AE1-4FDD-A707-1E782C596AE6}" type="datetimeFigureOut">
               <a:rPr lang="es-PE" smtClean="0"/>
-              <a:t>27/10/2024</a:t>
+              <a:t>10/12/2024</a:t>
             </a:fld>
             <a:endParaRPr lang="es-PE"/>
           </a:p>
@@ -3003,7 +3011,7 @@
           <a:p>
             <a:fld id="{5278D71A-5AE1-4FDD-A707-1E782C596AE6}" type="datetimeFigureOut">
               <a:rPr lang="es-PE" smtClean="0"/>
-              <a:t>27/10/2024</a:t>
+              <a:t>10/12/2024</a:t>
             </a:fld>
             <a:endParaRPr lang="es-PE"/>
           </a:p>
@@ -3716,6 +3724,7 @@
             </a:endParaRPr>
           </a:p>
           <a:p>
+            <a:pPr algn="just"/>
             <a:r>
               <a:rPr lang="es-ES" sz="900" dirty="0">
                 <a:solidFill>
@@ -3723,11 +3732,11 @@
                 </a:solidFill>
                 <a:latin typeface="Century Gothic" panose="020B0502020202020204" pitchFamily="34" charset="0"/>
               </a:rPr>
-              <a:t>Soy un joven universitario, natural de Huancayo, con una decidida aspiración de forjar una destacada carrera como Ingeniero de Sistemas y de expandir mis horizontes a nivel internacional. Considero que mi carácter se cimienta en valores inquebrantables como la honestidad y la lealtad, virtudes que han sido pilares fundamentales en mi desarrollo profesional.</a:t>
-            </a:r>
-          </a:p>
-          <a:p>
-            <a:endParaRPr lang="es-ES" sz="900" dirty="0">
+              <a:t>Soy un joven universitario originario de Huancayo, con una firme aspiración de construir una exitosa carrera como Ingeniero de Sistemas y de ampliar mis horizontes a nivel internacional. Me considero una persona guiada por valores sólidos como la honestidad y la lealtad, los cuales han sido fundamentales en mi crecimiento profesional. Además, me caracteriza un profundo interés por aprender y explorar nuevas tecnologías, lo que me impulsa a seguir desarrollándome en este campo.</a:t>
+            </a:r>
+          </a:p>
+          <a:p>
+            <a:endParaRPr lang="es-ES" sz="900" b="1" dirty="0">
               <a:solidFill>
                 <a:schemeClr val="tx1"/>
               </a:solidFill>
@@ -3950,6 +3959,7 @@
           <a:bodyPr rtlCol="0" anchor="t"/>
           <a:lstStyle/>
           <a:p>
+            <a:pPr algn="just"/>
             <a:r>
               <a:rPr lang="es-ES" sz="900" b="1" dirty="0">
                 <a:solidFill>
@@ -3961,6 +3971,7 @@
             </a:r>
           </a:p>
           <a:p>
+            <a:pPr algn="just"/>
             <a:endParaRPr lang="es-ES" sz="900" b="1" dirty="0">
               <a:solidFill>
                 <a:schemeClr val="tx1"/>
@@ -3969,6 +3980,7 @@
             </a:endParaRPr>
           </a:p>
           <a:p>
+            <a:pPr algn="just"/>
             <a:r>
               <a:rPr lang="es-ES" sz="900" b="1" dirty="0">
                 <a:solidFill>
@@ -3980,6 +3992,7 @@
             </a:r>
           </a:p>
           <a:p>
+            <a:pPr algn="just"/>
             <a:r>
               <a:rPr lang="es-ES" sz="900" b="1" i="1" dirty="0">
                 <a:solidFill>
@@ -3991,6 +4004,7 @@
             </a:r>
           </a:p>
           <a:p>
+            <a:pPr algn="just"/>
             <a:r>
               <a:rPr lang="es-ES" sz="900" dirty="0">
                 <a:solidFill>
@@ -4002,6 +4016,7 @@
             </a:r>
           </a:p>
           <a:p>
+            <a:pPr algn="just"/>
             <a:r>
               <a:rPr lang="es-ES" sz="900" dirty="0">
                 <a:solidFill>
@@ -4013,6 +4028,7 @@
             </a:r>
           </a:p>
           <a:p>
+            <a:pPr algn="just"/>
             <a:endParaRPr lang="es-ES" sz="900" dirty="0">
               <a:solidFill>
                 <a:schemeClr val="tx1"/>
@@ -4021,6 +4037,7 @@
             </a:endParaRPr>
           </a:p>
           <a:p>
+            <a:pPr algn="just"/>
             <a:r>
               <a:rPr lang="es-ES" sz="900" b="1" dirty="0">
                 <a:solidFill>
@@ -4032,6 +4049,7 @@
             </a:r>
           </a:p>
           <a:p>
+            <a:pPr algn="just"/>
             <a:r>
               <a:rPr lang="es-ES" sz="900" b="1" i="1" dirty="0">
                 <a:solidFill>
@@ -4039,57 +4057,80 @@
                 </a:solidFill>
                 <a:latin typeface="Century Gothic" panose="020B0502020202020204" pitchFamily="34" charset="0"/>
               </a:rPr>
-              <a:t>Grupo </a:t>
-            </a:r>
-            <a:r>
-              <a:rPr lang="es-ES" sz="900" b="1" i="1" dirty="0" err="1">
+              <a:t>Grupo Consigue Ventas Inversiones E.I.R.L., Lima, Perú</a:t>
+            </a:r>
+          </a:p>
+          <a:p>
+            <a:pPr algn="just"/>
+            <a:r>
+              <a:rPr lang="es-ES" sz="900" dirty="0">
                 <a:solidFill>
                   <a:schemeClr val="tx1"/>
                 </a:solidFill>
                 <a:latin typeface="Century Gothic" panose="020B0502020202020204" pitchFamily="34" charset="0"/>
               </a:rPr>
-              <a:t>Consigueventas</a:t>
-            </a:r>
-            <a:r>
-              <a:rPr lang="es-ES" sz="900" b="1" i="1" dirty="0">
+              <a:t>Set 2024 – Dic 2024</a:t>
+            </a:r>
+          </a:p>
+          <a:p>
+            <a:pPr algn="just"/>
+            <a:r>
+              <a:rPr lang="es-ES" sz="900" dirty="0">
                 <a:solidFill>
                   <a:schemeClr val="tx1"/>
                 </a:solidFill>
                 <a:latin typeface="Century Gothic" panose="020B0502020202020204" pitchFamily="34" charset="0"/>
               </a:rPr>
-              <a:t> Inversiones E.I.R.L., Lima, Perú</a:t>
-            </a:r>
-          </a:p>
-          <a:p>
-            <a:r>
-              <a:rPr lang="es-ES" sz="900" dirty="0">
+              <a:t>Como practicante en el área de desarrollo web de Grupo "Consigue Ventas", adquirí una valiosa experiencia en la creación y optimización de sitios web utilizando WordPress. En este rol, no solo brindé apoyo en el desarrollo de páginas web, sino que también lideré la construcción de otras, siempre enfocándome en garantizar la adaptabilidad en diversos dispositivos y asegurando una experiencia de usuario coherente y eficiente. Implementé mejoras en el diseño y funcionalidad, contribuyendo al éxito de los proyectos y a la satisfacción de los usuarios.</a:t>
+            </a:r>
+          </a:p>
+          <a:p>
+            <a:pPr algn="just"/>
+            <a:endParaRPr lang="es-ES" sz="900" b="1" dirty="0">
+              <a:solidFill>
+                <a:schemeClr val="tx1"/>
+              </a:solidFill>
+              <a:latin typeface="Century Gothic" panose="020B0502020202020204" pitchFamily="34" charset="0"/>
+            </a:endParaRPr>
+          </a:p>
+          <a:p>
+            <a:pPr algn="just"/>
+            <a:r>
+              <a:rPr lang="es-ES" sz="900" b="1" dirty="0">
                 <a:solidFill>
                   <a:schemeClr val="tx1"/>
                 </a:solidFill>
                 <a:latin typeface="Century Gothic" panose="020B0502020202020204" pitchFamily="34" charset="0"/>
               </a:rPr>
-              <a:t>Set 2024 – Oct 2024</a:t>
-            </a:r>
-          </a:p>
-          <a:p>
-            <a:r>
-              <a:rPr lang="es-ES" sz="900" dirty="0">
+              <a:t>FORMACIÓN ACADÉMICA</a:t>
+            </a:r>
+          </a:p>
+          <a:p>
+            <a:pPr algn="just"/>
+            <a:r>
+              <a:rPr lang="es-ES" sz="900" b="1" dirty="0">
                 <a:solidFill>
                   <a:schemeClr val="tx1"/>
                 </a:solidFill>
                 <a:latin typeface="Century Gothic" panose="020B0502020202020204" pitchFamily="34" charset="0"/>
               </a:rPr>
-              <a:t>Como practicante en el área de desarrollo web de Grupo </a:t>
-            </a:r>
-            <a:r>
-              <a:rPr lang="es-ES" sz="900" dirty="0" err="1">
+              <a:t>Universidad Nacional del Centro del Perú</a:t>
+            </a:r>
+          </a:p>
+          <a:p>
+            <a:pPr algn="just"/>
+            <a:r>
+              <a:rPr lang="es-ES" sz="900" dirty="0">
                 <a:solidFill>
                   <a:schemeClr val="tx1"/>
                 </a:solidFill>
                 <a:latin typeface="Century Gothic" panose="020B0502020202020204" pitchFamily="34" charset="0"/>
               </a:rPr>
-              <a:t>Consigueventas</a:t>
-            </a:r>
+              <a:t>Actualmente</a:t>
+            </a:r>
+          </a:p>
+          <a:p>
+            <a:pPr algn="just"/>
             <a:r>
               <a:rPr lang="es-ES" sz="900" dirty="0">
                 <a:solidFill>
@@ -4097,10 +4138,152 @@
                 </a:solidFill>
                 <a:latin typeface="Century Gothic" panose="020B0502020202020204" pitchFamily="34" charset="0"/>
               </a:rPr>
-              <a:t>, gané experiencia significativa en la creación y optimización de sitios web mediante WordPress. En este rol, fui responsable de desarrollar páginas adaptables para diversos dispositivos, incluyendo escritorio, tabletas y móviles, asegurando una experiencia de usuario coherente y eficiente. Implementé técnicas de diseño responsivo, mejorando la navegación y accesibilidad del sitio en múltiples plataformas.</a:t>
-            </a:r>
-          </a:p>
-          <a:p>
+              <a:t>Cursando la carrera de "Ingeniería de Sistemas"</a:t>
+            </a:r>
+          </a:p>
+          <a:p>
+            <a:pPr algn="just"/>
+            <a:r>
+              <a:rPr lang="es-ES" sz="900" dirty="0">
+                <a:solidFill>
+                  <a:schemeClr val="tx1"/>
+                </a:solidFill>
+                <a:latin typeface="Century Gothic" panose="020B0502020202020204" pitchFamily="34" charset="0"/>
+              </a:rPr>
+              <a:t>Actualmente, me encuentro cursando la carrera de Ingeniería de Sistemas en la Universidad Nacional del Centro del Perú, donde mi enfoque se centra en la creación, diseño y optimización.</a:t>
+            </a:r>
+          </a:p>
+          <a:p>
+            <a:pPr algn="just"/>
+            <a:r>
+              <a:rPr lang="es-ES" sz="900" dirty="0">
+                <a:solidFill>
+                  <a:schemeClr val="tx1"/>
+                </a:solidFill>
+                <a:latin typeface="Century Gothic" panose="020B0502020202020204" pitchFamily="34" charset="0"/>
+              </a:rPr>
+              <a:t>Universidad del Centro del Perú, Huancayo</a:t>
+            </a:r>
+          </a:p>
+          <a:p>
+            <a:pPr algn="just"/>
+            <a:endParaRPr lang="es-ES" sz="900" b="1" dirty="0">
+              <a:solidFill>
+                <a:schemeClr val="tx1"/>
+              </a:solidFill>
+              <a:latin typeface="Century Gothic" panose="020B0502020202020204" pitchFamily="34" charset="0"/>
+            </a:endParaRPr>
+          </a:p>
+          <a:p>
+            <a:pPr algn="just"/>
+            <a:r>
+              <a:rPr lang="es-ES" sz="900" b="1" dirty="0">
+                <a:solidFill>
+                  <a:schemeClr val="tx1"/>
+                </a:solidFill>
+                <a:latin typeface="Century Gothic" panose="020B0502020202020204" pitchFamily="34" charset="0"/>
+              </a:rPr>
+              <a:t>HABILIDADES TÉCNICAS</a:t>
+            </a:r>
+          </a:p>
+          <a:p>
+            <a:pPr algn="just"/>
+            <a:r>
+              <a:rPr lang="es-ES" sz="900" dirty="0">
+                <a:solidFill>
+                  <a:schemeClr val="tx1"/>
+                </a:solidFill>
+                <a:latin typeface="Century Gothic" panose="020B0502020202020204" pitchFamily="34" charset="0"/>
+              </a:rPr>
+              <a:t>Lenguajes de Programación: Python, Java, JavaScript, PHP</a:t>
+            </a:r>
+          </a:p>
+          <a:p>
+            <a:pPr algn="just"/>
+            <a:r>
+              <a:rPr lang="es-ES" sz="900" dirty="0">
+                <a:solidFill>
+                  <a:schemeClr val="tx1"/>
+                </a:solidFill>
+                <a:latin typeface="Century Gothic" panose="020B0502020202020204" pitchFamily="34" charset="0"/>
+              </a:rPr>
+              <a:t>Bases de Datos: MySQL, SQL Server</a:t>
+            </a:r>
+          </a:p>
+          <a:p>
+            <a:pPr algn="just"/>
+            <a:r>
+              <a:rPr lang="es-ES" sz="900" dirty="0">
+                <a:solidFill>
+                  <a:schemeClr val="tx1"/>
+                </a:solidFill>
+                <a:latin typeface="Century Gothic" panose="020B0502020202020204" pitchFamily="34" charset="0"/>
+              </a:rPr>
+              <a:t>Herramientas de Desarrollo: Git, GitHub, Docker, Visual Studio </a:t>
+            </a:r>
+            <a:r>
+              <a:rPr lang="es-ES" sz="900" dirty="0" err="1">
+                <a:solidFill>
+                  <a:schemeClr val="tx1"/>
+                </a:solidFill>
+                <a:latin typeface="Century Gothic" panose="020B0502020202020204" pitchFamily="34" charset="0"/>
+              </a:rPr>
+              <a:t>Code</a:t>
+            </a:r>
+            <a:r>
+              <a:rPr lang="es-ES" sz="900" dirty="0">
+                <a:solidFill>
+                  <a:schemeClr val="tx1"/>
+                </a:solidFill>
+                <a:latin typeface="Century Gothic" panose="020B0502020202020204" pitchFamily="34" charset="0"/>
+              </a:rPr>
+              <a:t>, XAMPP, Apache NetBeans</a:t>
+            </a:r>
+          </a:p>
+          <a:p>
+            <a:pPr algn="just"/>
+            <a:r>
+              <a:rPr lang="es-ES" sz="900" dirty="0">
+                <a:solidFill>
+                  <a:schemeClr val="tx1"/>
+                </a:solidFill>
+                <a:latin typeface="Century Gothic" panose="020B0502020202020204" pitchFamily="34" charset="0"/>
+              </a:rPr>
+              <a:t>Tecnologías de la Web: HTML, CSS, WordPress, Hostinger</a:t>
+            </a:r>
+          </a:p>
+          <a:p>
+            <a:pPr algn="just"/>
+            <a:r>
+              <a:rPr lang="es-ES" sz="900" dirty="0">
+                <a:solidFill>
+                  <a:schemeClr val="tx1"/>
+                </a:solidFill>
+                <a:latin typeface="Century Gothic" panose="020B0502020202020204" pitchFamily="34" charset="0"/>
+              </a:rPr>
+              <a:t>Otros Conocimientos: Word, Excel, PowerPoint, Access, </a:t>
+            </a:r>
+            <a:r>
+              <a:rPr lang="es-ES" sz="900" dirty="0" err="1">
+                <a:solidFill>
+                  <a:schemeClr val="tx1"/>
+                </a:solidFill>
+                <a:latin typeface="Century Gothic" panose="020B0502020202020204" pitchFamily="34" charset="0"/>
+              </a:rPr>
+              <a:t>Power</a:t>
+            </a:r>
+            <a:r>
+              <a:rPr lang="es-ES" sz="900" dirty="0">
+                <a:solidFill>
+                  <a:schemeClr val="tx1"/>
+                </a:solidFill>
+                <a:latin typeface="Century Gothic" panose="020B0502020202020204" pitchFamily="34" charset="0"/>
+              </a:rPr>
+              <a:t> BI</a:t>
+            </a:r>
+          </a:p>
+          <a:p>
+            <a:pPr algn="just"/>
             <a:endParaRPr lang="es-ES" sz="900" dirty="0">
               <a:solidFill>
                 <a:schemeClr val="tx1"/>
@@ -4109,165 +4292,7 @@
             </a:endParaRPr>
           </a:p>
           <a:p>
-            <a:r>
-              <a:rPr lang="es-ES" sz="900" b="1" dirty="0">
-                <a:solidFill>
-                  <a:schemeClr val="tx1"/>
-                </a:solidFill>
-                <a:latin typeface="Century Gothic" panose="020B0502020202020204" pitchFamily="34" charset="0"/>
-              </a:rPr>
-              <a:t>FORMACIÓN ACADÉMICA</a:t>
-            </a:r>
-          </a:p>
-          <a:p>
-            <a:endParaRPr lang="es-ES" sz="900" b="1" dirty="0">
-              <a:solidFill>
-                <a:schemeClr val="tx1"/>
-              </a:solidFill>
-              <a:latin typeface="Century Gothic" panose="020B0502020202020204" pitchFamily="34" charset="0"/>
-            </a:endParaRPr>
-          </a:p>
-          <a:p>
-            <a:r>
-              <a:rPr lang="es-ES" sz="900" b="1" dirty="0">
-                <a:solidFill>
-                  <a:schemeClr val="tx1"/>
-                </a:solidFill>
-                <a:latin typeface="Century Gothic" panose="020B0502020202020204" pitchFamily="34" charset="0"/>
-              </a:rPr>
-              <a:t>Universidad Nacional del Centro del Perú</a:t>
-            </a:r>
-          </a:p>
-          <a:p>
-            <a:r>
-              <a:rPr lang="es-ES" sz="900" dirty="0">
-                <a:solidFill>
-                  <a:schemeClr val="tx1"/>
-                </a:solidFill>
-                <a:latin typeface="Century Gothic" panose="020B0502020202020204" pitchFamily="34" charset="0"/>
-              </a:rPr>
-              <a:t>Actualmente</a:t>
-            </a:r>
-          </a:p>
-          <a:p>
-            <a:r>
-              <a:rPr lang="es-ES" sz="900" dirty="0">
-                <a:solidFill>
-                  <a:schemeClr val="tx1"/>
-                </a:solidFill>
-                <a:latin typeface="Century Gothic" panose="020B0502020202020204" pitchFamily="34" charset="0"/>
-              </a:rPr>
-              <a:t>Cursando la carrera de "Ingeniería de Sistemas"</a:t>
-            </a:r>
-          </a:p>
-          <a:p>
-            <a:r>
-              <a:rPr lang="es-ES" sz="900" dirty="0">
-                <a:solidFill>
-                  <a:schemeClr val="tx1"/>
-                </a:solidFill>
-                <a:latin typeface="Century Gothic" panose="020B0502020202020204" pitchFamily="34" charset="0"/>
-              </a:rPr>
-              <a:t>Actualmente, me encuentro cursando la carrera de Ingeniería de Sistemas en la Universidad Nacional del Centro del Perú, donde mi enfoque se centra en la creación, diseño y optimización.</a:t>
-            </a:r>
-          </a:p>
-          <a:p>
-            <a:r>
-              <a:rPr lang="es-ES" sz="900" dirty="0">
-                <a:solidFill>
-                  <a:schemeClr val="tx1"/>
-                </a:solidFill>
-                <a:latin typeface="Century Gothic" panose="020B0502020202020204" pitchFamily="34" charset="0"/>
-              </a:rPr>
-              <a:t>Universidad del Centro del Perú, Huancayo</a:t>
-            </a:r>
-          </a:p>
-          <a:p>
-            <a:endParaRPr lang="es-ES" sz="900" b="1" dirty="0">
-              <a:solidFill>
-                <a:schemeClr val="tx1"/>
-              </a:solidFill>
-              <a:latin typeface="Century Gothic" panose="020B0502020202020204" pitchFamily="34" charset="0"/>
-            </a:endParaRPr>
-          </a:p>
-          <a:p>
-            <a:r>
-              <a:rPr lang="es-ES" sz="900" b="1" dirty="0">
-                <a:solidFill>
-                  <a:schemeClr val="tx1"/>
-                </a:solidFill>
-                <a:latin typeface="Century Gothic" panose="020B0502020202020204" pitchFamily="34" charset="0"/>
-              </a:rPr>
-              <a:t>HABILIDADES TÉCNICAS</a:t>
-            </a:r>
-          </a:p>
-          <a:p>
-            <a:endParaRPr lang="es-ES" sz="900" b="1" dirty="0">
-              <a:solidFill>
-                <a:schemeClr val="tx1"/>
-              </a:solidFill>
-              <a:latin typeface="Century Gothic" panose="020B0502020202020204" pitchFamily="34" charset="0"/>
-            </a:endParaRPr>
-          </a:p>
-          <a:p>
-            <a:r>
-              <a:rPr lang="es-ES" sz="900" dirty="0">
-                <a:solidFill>
-                  <a:schemeClr val="tx1"/>
-                </a:solidFill>
-                <a:latin typeface="Century Gothic" panose="020B0502020202020204" pitchFamily="34" charset="0"/>
-              </a:rPr>
-              <a:t>Programación: HTML, CSS, JavaScript, PHP, Java</a:t>
-            </a:r>
-          </a:p>
-          <a:p>
-            <a:r>
-              <a:rPr lang="es-ES" sz="900" dirty="0">
-                <a:solidFill>
-                  <a:schemeClr val="tx1"/>
-                </a:solidFill>
-                <a:latin typeface="Century Gothic" panose="020B0502020202020204" pitchFamily="34" charset="0"/>
-              </a:rPr>
-              <a:t>Bases de Datos: SQL Server</a:t>
-            </a:r>
-          </a:p>
-          <a:p>
-            <a:r>
-              <a:rPr lang="es-ES" sz="900" dirty="0">
-                <a:solidFill>
-                  <a:schemeClr val="tx1"/>
-                </a:solidFill>
-                <a:latin typeface="Century Gothic" panose="020B0502020202020204" pitchFamily="34" charset="0"/>
-              </a:rPr>
-              <a:t>CMS y Plataformas: WordPress</a:t>
-            </a:r>
-          </a:p>
-          <a:p>
-            <a:r>
-              <a:rPr lang="en-US" sz="900" dirty="0">
-                <a:solidFill>
-                  <a:schemeClr val="tx1"/>
-                </a:solidFill>
-                <a:latin typeface="Century Gothic" panose="020B0502020202020204" pitchFamily="34" charset="0"/>
-              </a:rPr>
-              <a:t>Microsoft Office: Excel, Word, PowerPoint, Access</a:t>
-            </a:r>
-            <a:endParaRPr lang="es-ES" sz="900" dirty="0">
-              <a:solidFill>
-                <a:schemeClr val="tx1"/>
-              </a:solidFill>
-              <a:latin typeface="Century Gothic" panose="020B0502020202020204" pitchFamily="34" charset="0"/>
-            </a:endParaRPr>
-          </a:p>
-          <a:p>
-            <a:endParaRPr lang="es-ES" sz="900" b="1" dirty="0">
-              <a:solidFill>
-                <a:schemeClr val="tx1"/>
-              </a:solidFill>
-              <a:latin typeface="Century Gothic" panose="020B0502020202020204" pitchFamily="34" charset="0"/>
-            </a:endParaRPr>
-          </a:p>
-          <a:p>
+            <a:pPr algn="just"/>
             <a:r>
               <a:rPr lang="es-ES" sz="900" b="1" dirty="0">
                 <a:solidFill>
@@ -4279,14 +4304,7 @@
             </a:r>
           </a:p>
           <a:p>
-            <a:endParaRPr lang="es-ES" sz="900" b="1" dirty="0">
-              <a:solidFill>
-                <a:schemeClr val="tx1"/>
-              </a:solidFill>
-              <a:latin typeface="Century Gothic" panose="020B0502020202020204" pitchFamily="34" charset="0"/>
-            </a:endParaRPr>
-          </a:p>
-          <a:p>
+            <a:pPr algn="just"/>
             <a:r>
               <a:rPr lang="es-ES" sz="900" dirty="0">
                 <a:solidFill>
@@ -4298,6 +4316,7 @@
             </a:r>
           </a:p>
           <a:p>
+            <a:pPr algn="just"/>
             <a:r>
               <a:rPr lang="es-ES" sz="900" dirty="0">
                 <a:solidFill>
@@ -4309,6 +4328,7 @@
             </a:r>
           </a:p>
           <a:p>
+            <a:pPr algn="just"/>
             <a:r>
               <a:rPr lang="es-ES" sz="900" dirty="0">
                 <a:solidFill>
@@ -4320,6 +4340,7 @@
             </a:r>
           </a:p>
           <a:p>
+            <a:pPr algn="just"/>
             <a:r>
               <a:rPr lang="es-ES" sz="900" dirty="0">
                 <a:solidFill>
@@ -4331,6 +4352,7 @@
             </a:r>
           </a:p>
           <a:p>
+            <a:pPr algn="just"/>
             <a:r>
               <a:rPr lang="es-ES" sz="900" dirty="0">
                 <a:solidFill>
@@ -4342,6 +4364,7 @@
             </a:r>
           </a:p>
           <a:p>
+            <a:pPr algn="just"/>
             <a:r>
               <a:rPr lang="es-ES" sz="900" dirty="0">
                 <a:solidFill>
@@ -4354,6 +4377,42 @@
           </a:p>
         </p:txBody>
       </p:sp>
+      <p:pic>
+        <p:nvPicPr>
+          <p:cNvPr id="3" name="Imagen 2">
+            <a:extLst>
+              <a:ext uri="{FF2B5EF4-FFF2-40B4-BE49-F238E27FC236}">
+                <a16:creationId xmlns:a16="http://schemas.microsoft.com/office/drawing/2014/main" id="{EB3C51C4-7376-5599-689E-F25A63279EAD}"/>
+              </a:ext>
+            </a:extLst>
+          </p:cNvPr>
+          <p:cNvPicPr>
+            <a:picLocks noChangeAspect="1"/>
+          </p:cNvPicPr>
+          <p:nvPr/>
+        </p:nvPicPr>
+        <p:blipFill>
+          <a:blip r:embed="rId4">
+            <a:extLst>
+              <a:ext uri="{28A0092B-C50C-407E-A947-70E740481C1C}">
+                <a14:useLocalDpi xmlns:a14="http://schemas.microsoft.com/office/drawing/2010/main" val="0"/>
+              </a:ext>
+            </a:extLst>
+          </a:blip>
+          <a:stretch>
+            <a:fillRect/>
+          </a:stretch>
+        </p:blipFill>
+        <p:spPr>
+          <a:xfrm>
+            <a:off x="181619" y="7564739"/>
+            <a:ext cx="2158381" cy="2158381"/>
+          </a:xfrm>
+          <a:prstGeom prst="rect">
+            <a:avLst/>
+          </a:prstGeom>
+        </p:spPr>
+      </p:pic>
     </p:spTree>
     <p:extLst>
       <p:ext uri="{BB962C8B-B14F-4D97-AF65-F5344CB8AC3E}">

</xml_diff>

<commit_message>
Solucion de Fuentes y CV
</commit_message>
<xml_diff>
--- a/docs/CV.pptx
+++ b/docs/CV.pptx
@@ -200,7 +200,7 @@
           <a:p>
             <a:fld id="{45240B0F-28DB-4AD9-98DE-8C86967A83D3}" type="datetimeFigureOut">
               <a:rPr lang="es-PE" smtClean="0"/>
-              <a:t>10/12/2024</a:t>
+              <a:t>12/12/2024</a:t>
             </a:fld>
             <a:endParaRPr lang="es-PE"/>
           </a:p>
@@ -688,7 +688,7 @@
           <a:p>
             <a:fld id="{5278D71A-5AE1-4FDD-A707-1E782C596AE6}" type="datetimeFigureOut">
               <a:rPr lang="es-PE" smtClean="0"/>
-              <a:t>10/12/2024</a:t>
+              <a:t>12/12/2024</a:t>
             </a:fld>
             <a:endParaRPr lang="es-PE"/>
           </a:p>
@@ -858,7 +858,7 @@
           <a:p>
             <a:fld id="{5278D71A-5AE1-4FDD-A707-1E782C596AE6}" type="datetimeFigureOut">
               <a:rPr lang="es-PE" smtClean="0"/>
-              <a:t>10/12/2024</a:t>
+              <a:t>12/12/2024</a:t>
             </a:fld>
             <a:endParaRPr lang="es-PE"/>
           </a:p>
@@ -1038,7 +1038,7 @@
           <a:p>
             <a:fld id="{5278D71A-5AE1-4FDD-A707-1E782C596AE6}" type="datetimeFigureOut">
               <a:rPr lang="es-PE" smtClean="0"/>
-              <a:t>10/12/2024</a:t>
+              <a:t>12/12/2024</a:t>
             </a:fld>
             <a:endParaRPr lang="es-PE"/>
           </a:p>
@@ -1208,7 +1208,7 @@
           <a:p>
             <a:fld id="{5278D71A-5AE1-4FDD-A707-1E782C596AE6}" type="datetimeFigureOut">
               <a:rPr lang="es-PE" smtClean="0"/>
-              <a:t>10/12/2024</a:t>
+              <a:t>12/12/2024</a:t>
             </a:fld>
             <a:endParaRPr lang="es-PE"/>
           </a:p>
@@ -1452,7 +1452,7 @@
           <a:p>
             <a:fld id="{5278D71A-5AE1-4FDD-A707-1E782C596AE6}" type="datetimeFigureOut">
               <a:rPr lang="es-PE" smtClean="0"/>
-              <a:t>10/12/2024</a:t>
+              <a:t>12/12/2024</a:t>
             </a:fld>
             <a:endParaRPr lang="es-PE"/>
           </a:p>
@@ -1684,7 +1684,7 @@
           <a:p>
             <a:fld id="{5278D71A-5AE1-4FDD-A707-1E782C596AE6}" type="datetimeFigureOut">
               <a:rPr lang="es-PE" smtClean="0"/>
-              <a:t>10/12/2024</a:t>
+              <a:t>12/12/2024</a:t>
             </a:fld>
             <a:endParaRPr lang="es-PE"/>
           </a:p>
@@ -2051,7 +2051,7 @@
           <a:p>
             <a:fld id="{5278D71A-5AE1-4FDD-A707-1E782C596AE6}" type="datetimeFigureOut">
               <a:rPr lang="es-PE" smtClean="0"/>
-              <a:t>10/12/2024</a:t>
+              <a:t>12/12/2024</a:t>
             </a:fld>
             <a:endParaRPr lang="es-PE"/>
           </a:p>
@@ -2169,7 +2169,7 @@
           <a:p>
             <a:fld id="{5278D71A-5AE1-4FDD-A707-1E782C596AE6}" type="datetimeFigureOut">
               <a:rPr lang="es-PE" smtClean="0"/>
-              <a:t>10/12/2024</a:t>
+              <a:t>12/12/2024</a:t>
             </a:fld>
             <a:endParaRPr lang="es-PE"/>
           </a:p>
@@ -2264,7 +2264,7 @@
           <a:p>
             <a:fld id="{5278D71A-5AE1-4FDD-A707-1E782C596AE6}" type="datetimeFigureOut">
               <a:rPr lang="es-PE" smtClean="0"/>
-              <a:t>10/12/2024</a:t>
+              <a:t>12/12/2024</a:t>
             </a:fld>
             <a:endParaRPr lang="es-PE"/>
           </a:p>
@@ -2541,7 +2541,7 @@
           <a:p>
             <a:fld id="{5278D71A-5AE1-4FDD-A707-1E782C596AE6}" type="datetimeFigureOut">
               <a:rPr lang="es-PE" smtClean="0"/>
-              <a:t>10/12/2024</a:t>
+              <a:t>12/12/2024</a:t>
             </a:fld>
             <a:endParaRPr lang="es-PE"/>
           </a:p>
@@ -2798,7 +2798,7 @@
           <a:p>
             <a:fld id="{5278D71A-5AE1-4FDD-A707-1E782C596AE6}" type="datetimeFigureOut">
               <a:rPr lang="es-PE" smtClean="0"/>
-              <a:t>10/12/2024</a:t>
+              <a:t>12/12/2024</a:t>
             </a:fld>
             <a:endParaRPr lang="es-PE"/>
           </a:p>
@@ -3011,7 +3011,7 @@
           <a:p>
             <a:fld id="{5278D71A-5AE1-4FDD-A707-1E782C596AE6}" type="datetimeFigureOut">
               <a:rPr lang="es-PE" smtClean="0"/>
-              <a:t>10/12/2024</a:t>
+              <a:t>12/12/2024</a:t>
             </a:fld>
             <a:endParaRPr lang="es-PE"/>
           </a:p>
@@ -3674,8 +3674,8 @@
         </p:nvSpPr>
         <p:spPr>
           <a:xfrm>
-            <a:off x="180000" y="2324100"/>
-            <a:ext cx="2160000" cy="7399020"/>
+            <a:off x="180000" y="2324101"/>
+            <a:ext cx="2160000" cy="4617720"/>
           </a:xfrm>
           <a:prstGeom prst="rect">
             <a:avLst/>
@@ -3732,10 +3732,11 @@
                 </a:solidFill>
                 <a:latin typeface="Century Gothic" panose="020B0502020202020204" pitchFamily="34" charset="0"/>
               </a:rPr>
-              <a:t>Soy un joven universitario originario de Huancayo, con una firme aspiración de construir una exitosa carrera como Ingeniero de Sistemas y de ampliar mis horizontes a nivel internacional. Me considero una persona guiada por valores sólidos como la honestidad y la lealtad, los cuales han sido fundamentales en mi crecimiento profesional. Además, me caracteriza un profundo interés por aprender y explorar nuevas tecnologías, lo que me impulsa a seguir desarrollándome en este campo.</a:t>
-            </a:r>
-          </a:p>
-          <a:p>
+              <a:t>Soy un joven universitario originario de Huancayo, con una firme aspiración de construir una exitosa carrera como Ingeniero de Sistemas y de ampliar mis horizontes a nivel internacional. Me considero una persona guiada por valores sólidos como la honestidad y la lealtad. Además, me caracteriza un profundo interés por aprender y explorar nuevas tecnologías, lo que me impulsa a seguir desarrollándome en este campo.</a:t>
+            </a:r>
+          </a:p>
+          <a:p>
+            <a:pPr algn="just"/>
             <a:endParaRPr lang="es-ES" sz="900" b="1" dirty="0">
               <a:solidFill>
                 <a:schemeClr val="tx1"/>
@@ -3903,14 +3904,6 @@
               </a:rPr>
               <a:t>Viajes</a:t>
             </a:r>
-          </a:p>
-          <a:p>
-            <a:endParaRPr lang="es-ES" sz="900" dirty="0">
-              <a:solidFill>
-                <a:schemeClr val="tx1"/>
-              </a:solidFill>
-              <a:latin typeface="Century Gothic" panose="020B0502020202020204" pitchFamily="34" charset="0"/>
-            </a:endParaRPr>
           </a:p>
         </p:txBody>
       </p:sp>
@@ -3988,7 +3981,7 @@
                 </a:solidFill>
                 <a:latin typeface="Century Gothic" panose="020B0502020202020204" pitchFamily="34" charset="0"/>
               </a:rPr>
-              <a:t>Practicante</a:t>
+              <a:t>Practicante Ingeniería de Sistemas</a:t>
             </a:r>
           </a:p>
           <a:p>
@@ -4006,25 +3999,25 @@
           <a:p>
             <a:pPr algn="just"/>
             <a:r>
+              <a:rPr lang="es-ES" sz="900" i="1" dirty="0">
+                <a:solidFill>
+                  <a:schemeClr val="tx1"/>
+                </a:solidFill>
+                <a:latin typeface="Century Gothic" panose="020B0502020202020204" pitchFamily="34" charset="0"/>
+              </a:rPr>
+              <a:t>Set 2023 – Dic 2023</a:t>
+            </a:r>
+          </a:p>
+          <a:p>
+            <a:pPr algn="just"/>
+            <a:r>
               <a:rPr lang="es-ES" sz="900" dirty="0">
                 <a:solidFill>
                   <a:schemeClr val="tx1"/>
                 </a:solidFill>
                 <a:latin typeface="Century Gothic" panose="020B0502020202020204" pitchFamily="34" charset="0"/>
               </a:rPr>
-              <a:t>Set 2023 – Dic 2023</a:t>
-            </a:r>
-          </a:p>
-          <a:p>
-            <a:pPr algn="just"/>
-            <a:r>
-              <a:rPr lang="es-ES" sz="900" dirty="0">
-                <a:solidFill>
-                  <a:schemeClr val="tx1"/>
-                </a:solidFill>
-                <a:latin typeface="Century Gothic" panose="020B0502020202020204" pitchFamily="34" charset="0"/>
-              </a:rPr>
-              <a:t>Durante mi práctica profesional en COMSITEC S.A.C., una empresa dedicada a la venta de computadoras y equipos tecnológicos, adquirí experiencia en el área de desarrollo web y administración de bases de datos. Participé activamente en la mejora de la funcionalidad de la página web y en la actualización de la base de datos, optimizando los procesos de registro de productos e inventario para mejorar la eficiencia en la gestión de información de la empresa.</a:t>
+              <a:t>Durante mi práctica en COMSITEC S.A.C., adquirí experiencia en desarrollo web y administración de bases de datos. Mejoré la funcionalidad del sitio web y optimicé procesos de registro de productos e inventario, actualizando la base de datos para una gestión más eficiente de la información empresarial y mejorando su operatividad general.</a:t>
             </a:r>
           </a:p>
           <a:p>
@@ -4045,7 +4038,7 @@
                 </a:solidFill>
                 <a:latin typeface="Century Gothic" panose="020B0502020202020204" pitchFamily="34" charset="0"/>
               </a:rPr>
-              <a:t>Practicante</a:t>
+              <a:t>Practicante Ingeniería de Sistemas</a:t>
             </a:r>
           </a:p>
           <a:p>
@@ -4063,25 +4056,25 @@
           <a:p>
             <a:pPr algn="just"/>
             <a:r>
+              <a:rPr lang="es-ES" sz="900" i="1" dirty="0">
+                <a:solidFill>
+                  <a:schemeClr val="tx1"/>
+                </a:solidFill>
+                <a:latin typeface="Century Gothic" panose="020B0502020202020204" pitchFamily="34" charset="0"/>
+              </a:rPr>
+              <a:t>Set 2024 – Dic 2024</a:t>
+            </a:r>
+          </a:p>
+          <a:p>
+            <a:pPr algn="just"/>
+            <a:r>
               <a:rPr lang="es-ES" sz="900" dirty="0">
                 <a:solidFill>
                   <a:schemeClr val="tx1"/>
                 </a:solidFill>
                 <a:latin typeface="Century Gothic" panose="020B0502020202020204" pitchFamily="34" charset="0"/>
               </a:rPr>
-              <a:t>Set 2024 – Dic 2024</a:t>
-            </a:r>
-          </a:p>
-          <a:p>
-            <a:pPr algn="just"/>
-            <a:r>
-              <a:rPr lang="es-ES" sz="900" dirty="0">
-                <a:solidFill>
-                  <a:schemeClr val="tx1"/>
-                </a:solidFill>
-                <a:latin typeface="Century Gothic" panose="020B0502020202020204" pitchFamily="34" charset="0"/>
-              </a:rPr>
-              <a:t>Como practicante en el área de desarrollo web de Grupo "Consigue Ventas", adquirí una valiosa experiencia en la creación y optimización de sitios web utilizando WordPress. En este rol, no solo brindé apoyo en el desarrollo de páginas web, sino que también lideré la construcción de otras, siempre enfocándome en garantizar la adaptabilidad en diversos dispositivos y asegurando una experiencia de usuario coherente y eficiente. Implementé mejoras en el diseño y funcionalidad, contribuyendo al éxito de los proyectos y a la satisfacción de los usuarios.</a:t>
+              <a:t>Como practicante en desarrollo web en "Consigue Ventas", adquirí experiencia creando y optimizando sitios en WordPress. Lideré proyectos, asegurando adaptabilidad en dispositivos y una experiencia eficiente. Implementé mejoras de diseño y funcionalidad, contribuyendo al éxito de los proyectos y satisfacción de usuarios. Mi enfoque fue garantizar calidad y rendimiento óptimos..</a:t>
             </a:r>
           </a:p>
           <a:p>
@@ -4195,7 +4188,16 @@
                 </a:solidFill>
                 <a:latin typeface="Century Gothic" panose="020B0502020202020204" pitchFamily="34" charset="0"/>
               </a:rPr>
-              <a:t>Lenguajes de Programación: Python, Java, JavaScript, PHP</a:t>
+              <a:t>Lenguajes de Programación: </a:t>
+            </a:r>
+            <a:r>
+              <a:rPr lang="es-ES" sz="900" i="1" dirty="0">
+                <a:solidFill>
+                  <a:schemeClr val="tx1"/>
+                </a:solidFill>
+                <a:latin typeface="Century Gothic" panose="020B0502020202020204" pitchFamily="34" charset="0"/>
+              </a:rPr>
+              <a:t>Python, Java, JavaScript, PHP</a:t>
             </a:r>
           </a:p>
           <a:p>
@@ -4207,7 +4209,16 @@
                 </a:solidFill>
                 <a:latin typeface="Century Gothic" panose="020B0502020202020204" pitchFamily="34" charset="0"/>
               </a:rPr>
-              <a:t>Bases de Datos: MySQL, SQL Server</a:t>
+              <a:t>Bases de Datos: </a:t>
+            </a:r>
+            <a:r>
+              <a:rPr lang="es-ES" sz="900" i="1" dirty="0">
+                <a:solidFill>
+                  <a:schemeClr val="tx1"/>
+                </a:solidFill>
+                <a:latin typeface="Century Gothic" panose="020B0502020202020204" pitchFamily="34" charset="0"/>
+              </a:rPr>
+              <a:t>MySQL, SQL Server</a:t>
             </a:r>
           </a:p>
           <a:p>
@@ -4219,10 +4230,19 @@
                 </a:solidFill>
                 <a:latin typeface="Century Gothic" panose="020B0502020202020204" pitchFamily="34" charset="0"/>
               </a:rPr>
-              <a:t>Herramientas de Desarrollo: Git, GitHub, Docker, Visual Studio </a:t>
-            </a:r>
-            <a:r>
-              <a:rPr lang="es-ES" sz="900" dirty="0" err="1">
+              <a:t>Herramientas de Desarrollo: </a:t>
+            </a:r>
+            <a:r>
+              <a:rPr lang="es-ES" sz="900" i="1" dirty="0">
+                <a:solidFill>
+                  <a:schemeClr val="tx1"/>
+                </a:solidFill>
+                <a:latin typeface="Century Gothic" panose="020B0502020202020204" pitchFamily="34" charset="0"/>
+              </a:rPr>
+              <a:t>Git, GitHub, Docker, Visual Studio </a:t>
+            </a:r>
+            <a:r>
+              <a:rPr lang="es-ES" sz="900" i="1" dirty="0" err="1">
                 <a:solidFill>
                   <a:schemeClr val="tx1"/>
                 </a:solidFill>
@@ -4231,13 +4251,34 @@
               <a:t>Code</a:t>
             </a:r>
             <a:r>
+              <a:rPr lang="es-ES" sz="900" i="1" dirty="0">
+                <a:solidFill>
+                  <a:schemeClr val="tx1"/>
+                </a:solidFill>
+                <a:latin typeface="Century Gothic" panose="020B0502020202020204" pitchFamily="34" charset="0"/>
+              </a:rPr>
+              <a:t>, XAMPP, Apache NetBeans</a:t>
+            </a:r>
+          </a:p>
+          <a:p>
+            <a:pPr algn="just"/>
+            <a:r>
               <a:rPr lang="es-ES" sz="900" dirty="0">
                 <a:solidFill>
                   <a:schemeClr val="tx1"/>
                 </a:solidFill>
                 <a:latin typeface="Century Gothic" panose="020B0502020202020204" pitchFamily="34" charset="0"/>
               </a:rPr>
-              <a:t>, XAMPP, Apache NetBeans</a:t>
+              <a:t>Tecnologías de la Web: </a:t>
+            </a:r>
+            <a:r>
+              <a:rPr lang="es-ES" sz="900" i="1" dirty="0">
+                <a:solidFill>
+                  <a:schemeClr val="tx1"/>
+                </a:solidFill>
+                <a:latin typeface="Century Gothic" panose="020B0502020202020204" pitchFamily="34" charset="0"/>
+              </a:rPr>
+              <a:t>HTML, CSS, WordPress, Hostinger</a:t>
             </a:r>
           </a:p>
           <a:p>
@@ -4249,42 +4290,39 @@
                 </a:solidFill>
                 <a:latin typeface="Century Gothic" panose="020B0502020202020204" pitchFamily="34" charset="0"/>
               </a:rPr>
-              <a:t>Tecnologías de la Web: HTML, CSS, WordPress, Hostinger</a:t>
+              <a:t>Otros Conocimientos: </a:t>
+            </a:r>
+            <a:r>
+              <a:rPr lang="es-ES" sz="900" i="1" dirty="0">
+                <a:solidFill>
+                  <a:schemeClr val="tx1"/>
+                </a:solidFill>
+                <a:latin typeface="Century Gothic" panose="020B0502020202020204" pitchFamily="34" charset="0"/>
+              </a:rPr>
+              <a:t>Word, Excel, PowerPoint, Access, </a:t>
+            </a:r>
+            <a:r>
+              <a:rPr lang="es-ES" sz="900" i="1" dirty="0" err="1">
+                <a:solidFill>
+                  <a:schemeClr val="tx1"/>
+                </a:solidFill>
+                <a:latin typeface="Century Gothic" panose="020B0502020202020204" pitchFamily="34" charset="0"/>
+              </a:rPr>
+              <a:t>Power</a:t>
+            </a:r>
+            <a:r>
+              <a:rPr lang="es-ES" sz="900" i="1" dirty="0">
+                <a:solidFill>
+                  <a:schemeClr val="tx1"/>
+                </a:solidFill>
+                <a:latin typeface="Century Gothic" panose="020B0502020202020204" pitchFamily="34" charset="0"/>
+              </a:rPr>
+              <a:t> BI</a:t>
             </a:r>
           </a:p>
           <a:p>
             <a:pPr algn="just"/>
-            <a:r>
-              <a:rPr lang="es-ES" sz="900" dirty="0">
-                <a:solidFill>
-                  <a:schemeClr val="tx1"/>
-                </a:solidFill>
-                <a:latin typeface="Century Gothic" panose="020B0502020202020204" pitchFamily="34" charset="0"/>
-              </a:rPr>
-              <a:t>Otros Conocimientos: Word, Excel, PowerPoint, Access, </a:t>
-            </a:r>
-            <a:r>
-              <a:rPr lang="es-ES" sz="900" dirty="0" err="1">
-                <a:solidFill>
-                  <a:schemeClr val="tx1"/>
-                </a:solidFill>
-                <a:latin typeface="Century Gothic" panose="020B0502020202020204" pitchFamily="34" charset="0"/>
-              </a:rPr>
-              <a:t>Power</a:t>
-            </a:r>
-            <a:r>
-              <a:rPr lang="es-ES" sz="900" dirty="0">
-                <a:solidFill>
-                  <a:schemeClr val="tx1"/>
-                </a:solidFill>
-                <a:latin typeface="Century Gothic" panose="020B0502020202020204" pitchFamily="34" charset="0"/>
-              </a:rPr>
-              <a:t> BI</a:t>
-            </a:r>
-          </a:p>
-          <a:p>
-            <a:pPr algn="just"/>
-            <a:endParaRPr lang="es-ES" sz="900" dirty="0">
+            <a:endParaRPr lang="es-ES" sz="900" i="1" dirty="0">
               <a:solidFill>
                 <a:schemeClr val="tx1"/>
               </a:solidFill>
@@ -4405,14 +4443,84 @@
         </p:blipFill>
         <p:spPr>
           <a:xfrm>
-            <a:off x="181619" y="7564739"/>
-            <a:ext cx="2158381" cy="2158381"/>
+            <a:off x="180000" y="7571020"/>
+            <a:ext cx="2152100" cy="2152100"/>
           </a:xfrm>
           <a:prstGeom prst="rect">
             <a:avLst/>
           </a:prstGeom>
         </p:spPr>
       </p:pic>
+      <p:sp>
+        <p:nvSpPr>
+          <p:cNvPr id="2" name="Rectángulo 1">
+            <a:extLst>
+              <a:ext uri="{FF2B5EF4-FFF2-40B4-BE49-F238E27FC236}">
+                <a16:creationId xmlns:a16="http://schemas.microsoft.com/office/drawing/2014/main" id="{2B880CC3-6ABC-AD61-E780-551DD0BD0CCF}"/>
+              </a:ext>
+            </a:extLst>
+          </p:cNvPr>
+          <p:cNvSpPr/>
+          <p:nvPr/>
+        </p:nvSpPr>
+        <p:spPr>
+          <a:xfrm>
+            <a:off x="180000" y="7208140"/>
+            <a:ext cx="2160000" cy="360000"/>
+          </a:xfrm>
+          <a:prstGeom prst="rect">
+            <a:avLst/>
+          </a:prstGeom>
+          <a:noFill/>
+          <a:ln>
+            <a:noFill/>
+          </a:ln>
+        </p:spPr>
+        <p:style>
+          <a:lnRef idx="2">
+            <a:schemeClr val="accent1">
+              <a:shade val="50000"/>
+            </a:schemeClr>
+          </a:lnRef>
+          <a:fillRef idx="1">
+            <a:schemeClr val="accent1"/>
+          </a:fillRef>
+          <a:effectRef idx="0">
+            <a:schemeClr val="accent1"/>
+          </a:effectRef>
+          <a:fontRef idx="minor">
+            <a:schemeClr val="lt1"/>
+          </a:fontRef>
+        </p:style>
+        <p:txBody>
+          <a:bodyPr rtlCol="0" anchor="t"/>
+          <a:lstStyle/>
+          <a:p>
+            <a:r>
+              <a:rPr lang="es-ES" sz="900" dirty="0">
+                <a:solidFill>
+                  <a:schemeClr val="tx1"/>
+                </a:solidFill>
+                <a:latin typeface="Century Gothic" panose="020B0502020202020204" pitchFamily="34" charset="0"/>
+                <a:hlinkClick r:id="rId5">
+                  <a:extLst>
+                    <a:ext uri="{A12FA001-AC4F-418D-AE19-62706E023703}">
+                      <ahyp:hlinkClr xmlns:ahyp="http://schemas.microsoft.com/office/drawing/2018/hyperlinkcolor" val="tx"/>
+                    </a:ext>
+                  </a:extLst>
+                </a:hlinkClick>
+              </a:rPr>
+              <a:t>https://jcarloscc2001.github.io/Portafolio.github.io/</a:t>
+            </a:r>
+            <a:endParaRPr lang="es-ES" sz="900" dirty="0">
+              <a:solidFill>
+                <a:schemeClr val="tx1"/>
+              </a:solidFill>
+              <a:latin typeface="Century Gothic" panose="020B0502020202020204" pitchFamily="34" charset="0"/>
+            </a:endParaRPr>
+          </a:p>
+        </p:txBody>
+      </p:sp>
     </p:spTree>
     <p:extLst>
       <p:ext uri="{BB962C8B-B14F-4D97-AF65-F5344CB8AC3E}">

</xml_diff>

<commit_message>
Cambios de Diseño, responsivo y agregado proyectos
</commit_message>
<xml_diff>
--- a/docs/CV.pptx
+++ b/docs/CV.pptx
@@ -200,7 +200,7 @@
           <a:p>
             <a:fld id="{45240B0F-28DB-4AD9-98DE-8C86967A83D3}" type="datetimeFigureOut">
               <a:rPr lang="es-PE" smtClean="0"/>
-              <a:t>12/12/2024</a:t>
+              <a:t>17/12/2024</a:t>
             </a:fld>
             <a:endParaRPr lang="es-PE"/>
           </a:p>
@@ -688,7 +688,7 @@
           <a:p>
             <a:fld id="{5278D71A-5AE1-4FDD-A707-1E782C596AE6}" type="datetimeFigureOut">
               <a:rPr lang="es-PE" smtClean="0"/>
-              <a:t>12/12/2024</a:t>
+              <a:t>17/12/2024</a:t>
             </a:fld>
             <a:endParaRPr lang="es-PE"/>
           </a:p>
@@ -858,7 +858,7 @@
           <a:p>
             <a:fld id="{5278D71A-5AE1-4FDD-A707-1E782C596AE6}" type="datetimeFigureOut">
               <a:rPr lang="es-PE" smtClean="0"/>
-              <a:t>12/12/2024</a:t>
+              <a:t>17/12/2024</a:t>
             </a:fld>
             <a:endParaRPr lang="es-PE"/>
           </a:p>
@@ -1038,7 +1038,7 @@
           <a:p>
             <a:fld id="{5278D71A-5AE1-4FDD-A707-1E782C596AE6}" type="datetimeFigureOut">
               <a:rPr lang="es-PE" smtClean="0"/>
-              <a:t>12/12/2024</a:t>
+              <a:t>17/12/2024</a:t>
             </a:fld>
             <a:endParaRPr lang="es-PE"/>
           </a:p>
@@ -1208,7 +1208,7 @@
           <a:p>
             <a:fld id="{5278D71A-5AE1-4FDD-A707-1E782C596AE6}" type="datetimeFigureOut">
               <a:rPr lang="es-PE" smtClean="0"/>
-              <a:t>12/12/2024</a:t>
+              <a:t>17/12/2024</a:t>
             </a:fld>
             <a:endParaRPr lang="es-PE"/>
           </a:p>
@@ -1452,7 +1452,7 @@
           <a:p>
             <a:fld id="{5278D71A-5AE1-4FDD-A707-1E782C596AE6}" type="datetimeFigureOut">
               <a:rPr lang="es-PE" smtClean="0"/>
-              <a:t>12/12/2024</a:t>
+              <a:t>17/12/2024</a:t>
             </a:fld>
             <a:endParaRPr lang="es-PE"/>
           </a:p>
@@ -1684,7 +1684,7 @@
           <a:p>
             <a:fld id="{5278D71A-5AE1-4FDD-A707-1E782C596AE6}" type="datetimeFigureOut">
               <a:rPr lang="es-PE" smtClean="0"/>
-              <a:t>12/12/2024</a:t>
+              <a:t>17/12/2024</a:t>
             </a:fld>
             <a:endParaRPr lang="es-PE"/>
           </a:p>
@@ -2051,7 +2051,7 @@
           <a:p>
             <a:fld id="{5278D71A-5AE1-4FDD-A707-1E782C596AE6}" type="datetimeFigureOut">
               <a:rPr lang="es-PE" smtClean="0"/>
-              <a:t>12/12/2024</a:t>
+              <a:t>17/12/2024</a:t>
             </a:fld>
             <a:endParaRPr lang="es-PE"/>
           </a:p>
@@ -2169,7 +2169,7 @@
           <a:p>
             <a:fld id="{5278D71A-5AE1-4FDD-A707-1E782C596AE6}" type="datetimeFigureOut">
               <a:rPr lang="es-PE" smtClean="0"/>
-              <a:t>12/12/2024</a:t>
+              <a:t>17/12/2024</a:t>
             </a:fld>
             <a:endParaRPr lang="es-PE"/>
           </a:p>
@@ -2264,7 +2264,7 @@
           <a:p>
             <a:fld id="{5278D71A-5AE1-4FDD-A707-1E782C596AE6}" type="datetimeFigureOut">
               <a:rPr lang="es-PE" smtClean="0"/>
-              <a:t>12/12/2024</a:t>
+              <a:t>17/12/2024</a:t>
             </a:fld>
             <a:endParaRPr lang="es-PE"/>
           </a:p>
@@ -2541,7 +2541,7 @@
           <a:p>
             <a:fld id="{5278D71A-5AE1-4FDD-A707-1E782C596AE6}" type="datetimeFigureOut">
               <a:rPr lang="es-PE" smtClean="0"/>
-              <a:t>12/12/2024</a:t>
+              <a:t>17/12/2024</a:t>
             </a:fld>
             <a:endParaRPr lang="es-PE"/>
           </a:p>
@@ -2798,7 +2798,7 @@
           <a:p>
             <a:fld id="{5278D71A-5AE1-4FDD-A707-1E782C596AE6}" type="datetimeFigureOut">
               <a:rPr lang="es-PE" smtClean="0"/>
-              <a:t>12/12/2024</a:t>
+              <a:t>17/12/2024</a:t>
             </a:fld>
             <a:endParaRPr lang="es-PE"/>
           </a:p>
@@ -3011,7 +3011,7 @@
           <a:p>
             <a:fld id="{5278D71A-5AE1-4FDD-A707-1E782C596AE6}" type="datetimeFigureOut">
               <a:rPr lang="es-PE" smtClean="0"/>
-              <a:t>12/12/2024</a:t>
+              <a:t>17/12/2024</a:t>
             </a:fld>
             <a:endParaRPr lang="es-PE"/>
           </a:p>
@@ -3904,6 +3904,31 @@
               </a:rPr>
               <a:t>Viajes</a:t>
             </a:r>
+            <a:br>
+              <a:rPr lang="es-ES" sz="900" dirty="0">
+                <a:solidFill>
+                  <a:schemeClr val="tx1"/>
+                </a:solidFill>
+                <a:latin typeface="Century Gothic" panose="020B0502020202020204" pitchFamily="34" charset="0"/>
+              </a:rPr>
+            </a:br>
+            <a:br>
+              <a:rPr lang="es-ES" sz="900" dirty="0">
+                <a:solidFill>
+                  <a:schemeClr val="tx1"/>
+                </a:solidFill>
+                <a:latin typeface="Century Gothic" panose="020B0502020202020204" pitchFamily="34" charset="0"/>
+              </a:rPr>
+            </a:br>
+            <a:r>
+              <a:rPr lang="es-ES" sz="900" b="1" dirty="0">
+                <a:solidFill>
+                  <a:schemeClr val="tx1"/>
+                </a:solidFill>
+                <a:latin typeface="Century Gothic" panose="020B0502020202020204" pitchFamily="34" charset="0"/>
+              </a:rPr>
+              <a:t>PORTAFOLIO</a:t>
+            </a:r>
           </a:p>
         </p:txBody>
       </p:sp>
@@ -3981,7 +4006,7 @@
                 </a:solidFill>
                 <a:latin typeface="Century Gothic" panose="020B0502020202020204" pitchFamily="34" charset="0"/>
               </a:rPr>
-              <a:t>Practicante Ingeniería de Sistemas</a:t>
+              <a:t>Desarrollador Web</a:t>
             </a:r>
           </a:p>
           <a:p>
@@ -4017,64 +4042,55 @@
                 </a:solidFill>
                 <a:latin typeface="Century Gothic" panose="020B0502020202020204" pitchFamily="34" charset="0"/>
               </a:rPr>
-              <a:t>Durante mi práctica en COMSITEC S.A.C., adquirí experiencia en desarrollo web y administración de bases de datos. Mejoré la funcionalidad del sitio web y optimicé procesos de registro de productos e inventario, actualizando la base de datos para una gestión más eficiente de la información empresarial y mejorando su operatividad general.</a:t>
+              <a:t>Me desempeñé en COMSITEC S.A.C., desarrollando experiencia en desarrollo web y bases de datos. Optimicé procesos de registro e inventario, mejoré la funcionalidad del sitio web y actualicé la base de datos para una gestión empresarial más eficiente y operativa.</a:t>
             </a:r>
           </a:p>
           <a:p>
             <a:pPr algn="just"/>
-            <a:endParaRPr lang="es-ES" sz="900" dirty="0">
-              <a:solidFill>
-                <a:schemeClr val="tx1"/>
-              </a:solidFill>
-              <a:latin typeface="Century Gothic" panose="020B0502020202020204" pitchFamily="34" charset="0"/>
-            </a:endParaRPr>
+            <a:r>
+              <a:rPr lang="es-ES" sz="900" b="1" dirty="0">
+                <a:solidFill>
+                  <a:schemeClr val="tx1"/>
+                </a:solidFill>
+                <a:latin typeface="Century Gothic" panose="020B0502020202020204" pitchFamily="34" charset="0"/>
+              </a:rPr>
+              <a:t>Desarrollador Web</a:t>
+            </a:r>
           </a:p>
           <a:p>
             <a:pPr algn="just"/>
             <a:r>
-              <a:rPr lang="es-ES" sz="900" b="1" dirty="0">
-                <a:solidFill>
-                  <a:schemeClr val="tx1"/>
-                </a:solidFill>
-                <a:latin typeface="Century Gothic" panose="020B0502020202020204" pitchFamily="34" charset="0"/>
-              </a:rPr>
-              <a:t>Practicante Ingeniería de Sistemas</a:t>
+              <a:rPr lang="es-ES" sz="900" b="1" i="1" dirty="0">
+                <a:solidFill>
+                  <a:schemeClr val="tx1"/>
+                </a:solidFill>
+                <a:latin typeface="Century Gothic" panose="020B0502020202020204" pitchFamily="34" charset="0"/>
+              </a:rPr>
+              <a:t>Grupo Consigue Ventas Inversiones E.I.R.L., Lima, Perú</a:t>
             </a:r>
           </a:p>
           <a:p>
             <a:pPr algn="just"/>
             <a:r>
-              <a:rPr lang="es-ES" sz="900" b="1" i="1" dirty="0">
-                <a:solidFill>
-                  <a:schemeClr val="tx1"/>
-                </a:solidFill>
-                <a:latin typeface="Century Gothic" panose="020B0502020202020204" pitchFamily="34" charset="0"/>
-              </a:rPr>
-              <a:t>Grupo Consigue Ventas Inversiones E.I.R.L., Lima, Perú</a:t>
+              <a:rPr lang="es-ES" sz="900" i="1" dirty="0">
+                <a:solidFill>
+                  <a:schemeClr val="tx1"/>
+                </a:solidFill>
+                <a:latin typeface="Century Gothic" panose="020B0502020202020204" pitchFamily="34" charset="0"/>
+              </a:rPr>
+              <a:t>Set 2024 – Dic 2024</a:t>
             </a:r>
           </a:p>
           <a:p>
             <a:pPr algn="just"/>
             <a:r>
-              <a:rPr lang="es-ES" sz="900" i="1" dirty="0">
-                <a:solidFill>
-                  <a:schemeClr val="tx1"/>
-                </a:solidFill>
-                <a:latin typeface="Century Gothic" panose="020B0502020202020204" pitchFamily="34" charset="0"/>
-              </a:rPr>
-              <a:t>Set 2024 – Dic 2024</a:t>
-            </a:r>
-          </a:p>
-          <a:p>
-            <a:pPr algn="just"/>
-            <a:r>
               <a:rPr lang="es-ES" sz="900" dirty="0">
                 <a:solidFill>
                   <a:schemeClr val="tx1"/>
                 </a:solidFill>
                 <a:latin typeface="Century Gothic" panose="020B0502020202020204" pitchFamily="34" charset="0"/>
               </a:rPr>
-              <a:t>Como practicante en desarrollo web en "Consigue Ventas", adquirí experiencia creando y optimizando sitios en WordPress. Lideré proyectos, asegurando adaptabilidad en dispositivos y una experiencia eficiente. Implementé mejoras de diseño y funcionalidad, contribuyendo al éxito de los proyectos y satisfacción de usuarios. Mi enfoque fue garantizar calidad y rendimiento óptimos..</a:t>
+              <a:t>Trabajé como desarrollador web en "Consigue Ventas", optimizando sitios WordPress y liderando proyectos. Implementé mejoras de diseño y funcionalidad, asegurando adaptabilidad, rendimiento óptimo y experiencia eficiente en dispositivos, contribuyendo al éxito de proyectos y satisfacción de usuarios.</a:t>
             </a:r>
           </a:p>
           <a:p>
@@ -4443,8 +4459,8 @@
         </p:blipFill>
         <p:spPr>
           <a:xfrm>
-            <a:off x="180000" y="7571020"/>
-            <a:ext cx="2152100" cy="2152100"/>
+            <a:off x="268560" y="7298535"/>
+            <a:ext cx="1080000" cy="1080000"/>
           </a:xfrm>
           <a:prstGeom prst="rect">
             <a:avLst/>
@@ -4465,7 +4481,7 @@
         </p:nvSpPr>
         <p:spPr>
           <a:xfrm>
-            <a:off x="180000" y="7208140"/>
+            <a:off x="180000" y="8473969"/>
             <a:ext cx="2160000" cy="360000"/>
           </a:xfrm>
           <a:prstGeom prst="rect">

</xml_diff>